<commit_message>
Fin de la storyboard
</commit_message>
<xml_diff>
--- a/Projet/Story Board.pptx
+++ b/Projet/Story Board.pptx
@@ -10,7 +10,8 @@
     <p:sldId id="259" r:id="rId4"/>
     <p:sldId id="260" r:id="rId5"/>
     <p:sldId id="261" r:id="rId6"/>
-    <p:sldId id="256" r:id="rId7"/>
+    <p:sldId id="262" r:id="rId7"/>
+    <p:sldId id="263" r:id="rId8"/>
   </p:sldIdLst>
   <p:sldSz cx="9144000" cy="6858000" type="screen4x3"/>
   <p:notesSz cx="6858000" cy="9144000"/>
@@ -4330,7 +4331,7 @@
       </p:grpSpPr>
       <p:pic>
         <p:nvPicPr>
-          <p:cNvPr id="4" name="Image 3" descr="Accueil site v2.png"/>
+          <p:cNvPr id="39" name="Image 38" descr="Accueil site v2.png"/>
           <p:cNvPicPr>
             <a:picLocks noChangeAspect="1"/>
           </p:cNvPicPr>
@@ -4344,8 +4345,8 @@
         </p:blipFill>
         <p:spPr>
           <a:xfrm>
-            <a:off x="0" y="490366"/>
-            <a:ext cx="9144000" cy="5877267"/>
+            <a:off x="539552" y="620688"/>
+            <a:ext cx="7932955" cy="5098873"/>
           </a:xfrm>
           <a:prstGeom prst="rect">
             <a:avLst/>
@@ -4366,6 +4367,498 @@
           </a:effectLst>
         </p:spPr>
       </p:pic>
+      <p:sp>
+        <p:nvSpPr>
+          <p:cNvPr id="20" name="Rectangle 19"/>
+          <p:cNvSpPr/>
+          <p:nvPr/>
+        </p:nvSpPr>
+        <p:spPr>
+          <a:xfrm>
+            <a:off x="899592" y="6165304"/>
+            <a:ext cx="648072" cy="288032"/>
+          </a:xfrm>
+          <a:prstGeom prst="rect">
+            <a:avLst/>
+          </a:prstGeom>
+          <a:solidFill>
+            <a:srgbClr val="00B050"/>
+          </a:solidFill>
+          <a:ln>
+            <a:solidFill>
+              <a:schemeClr val="tx1"/>
+            </a:solidFill>
+          </a:ln>
+        </p:spPr>
+        <p:style>
+          <a:lnRef idx="3">
+            <a:schemeClr val="lt1"/>
+          </a:lnRef>
+          <a:fillRef idx="1">
+            <a:schemeClr val="accent3"/>
+          </a:fillRef>
+          <a:effectRef idx="1">
+            <a:schemeClr val="accent3"/>
+          </a:effectRef>
+          <a:fontRef idx="minor">
+            <a:schemeClr val="lt1"/>
+          </a:fontRef>
+        </p:style>
+        <p:txBody>
+          <a:bodyPr rtlCol="0" anchor="ctr"/>
+          <a:lstStyle/>
+          <a:p>
+            <a:pPr algn="ctr"/>
+            <a:endParaRPr lang="fr-FR" dirty="0"/>
+          </a:p>
+        </p:txBody>
+      </p:sp>
+      <p:sp>
+        <p:nvSpPr>
+          <p:cNvPr id="21" name="ZoneTexte 20"/>
+          <p:cNvSpPr txBox="1"/>
+          <p:nvPr/>
+        </p:nvSpPr>
+        <p:spPr>
+          <a:xfrm>
+            <a:off x="1547664" y="6093296"/>
+            <a:ext cx="875240" cy="369332"/>
+          </a:xfrm>
+          <a:prstGeom prst="rect">
+            <a:avLst/>
+          </a:prstGeom>
+          <a:noFill/>
+        </p:spPr>
+        <p:txBody>
+          <a:bodyPr wrap="none" rtlCol="0">
+            <a:spAutoFit/>
+          </a:bodyPr>
+          <a:lstStyle/>
+          <a:p>
+            <a:r>
+              <a:rPr lang="fr-FR" dirty="0" smtClean="0"/>
+              <a:t>: Image</a:t>
+            </a:r>
+            <a:endParaRPr lang="fr-FR" dirty="0"/>
+          </a:p>
+        </p:txBody>
+      </p:sp>
+      <p:sp>
+        <p:nvSpPr>
+          <p:cNvPr id="22" name="Rectangle 21"/>
+          <p:cNvSpPr/>
+          <p:nvPr/>
+        </p:nvSpPr>
+        <p:spPr>
+          <a:xfrm>
+            <a:off x="3563888" y="6165304"/>
+            <a:ext cx="648072" cy="288032"/>
+          </a:xfrm>
+          <a:prstGeom prst="rect">
+            <a:avLst/>
+          </a:prstGeom>
+          <a:solidFill>
+            <a:srgbClr val="FF0000"/>
+          </a:solidFill>
+          <a:ln>
+            <a:solidFill>
+              <a:schemeClr val="tx1"/>
+            </a:solidFill>
+          </a:ln>
+        </p:spPr>
+        <p:style>
+          <a:lnRef idx="3">
+            <a:schemeClr val="lt1"/>
+          </a:lnRef>
+          <a:fillRef idx="1">
+            <a:schemeClr val="accent3"/>
+          </a:fillRef>
+          <a:effectRef idx="1">
+            <a:schemeClr val="accent3"/>
+          </a:effectRef>
+          <a:fontRef idx="minor">
+            <a:schemeClr val="lt1"/>
+          </a:fontRef>
+        </p:style>
+        <p:txBody>
+          <a:bodyPr rtlCol="0" anchor="ctr"/>
+          <a:lstStyle/>
+          <a:p>
+            <a:pPr algn="ctr"/>
+            <a:endParaRPr lang="fr-FR" dirty="0"/>
+          </a:p>
+        </p:txBody>
+      </p:sp>
+      <p:sp>
+        <p:nvSpPr>
+          <p:cNvPr id="23" name="Rectangle 22"/>
+          <p:cNvSpPr/>
+          <p:nvPr/>
+        </p:nvSpPr>
+        <p:spPr>
+          <a:xfrm>
+            <a:off x="5940152" y="6165304"/>
+            <a:ext cx="648072" cy="288032"/>
+          </a:xfrm>
+          <a:prstGeom prst="rect">
+            <a:avLst/>
+          </a:prstGeom>
+          <a:solidFill>
+            <a:srgbClr val="00B0F0"/>
+          </a:solidFill>
+          <a:ln>
+            <a:solidFill>
+              <a:schemeClr val="tx1"/>
+            </a:solidFill>
+          </a:ln>
+        </p:spPr>
+        <p:style>
+          <a:lnRef idx="3">
+            <a:schemeClr val="lt1"/>
+          </a:lnRef>
+          <a:fillRef idx="1">
+            <a:schemeClr val="accent3"/>
+          </a:fillRef>
+          <a:effectRef idx="1">
+            <a:schemeClr val="accent3"/>
+          </a:effectRef>
+          <a:fontRef idx="minor">
+            <a:schemeClr val="lt1"/>
+          </a:fontRef>
+        </p:style>
+        <p:txBody>
+          <a:bodyPr rtlCol="0" anchor="ctr"/>
+          <a:lstStyle/>
+          <a:p>
+            <a:pPr algn="ctr"/>
+            <a:endParaRPr lang="fr-FR" dirty="0"/>
+          </a:p>
+        </p:txBody>
+      </p:sp>
+      <p:sp>
+        <p:nvSpPr>
+          <p:cNvPr id="24" name="ZoneTexte 23"/>
+          <p:cNvSpPr txBox="1"/>
+          <p:nvPr/>
+        </p:nvSpPr>
+        <p:spPr>
+          <a:xfrm>
+            <a:off x="4211960" y="6093296"/>
+            <a:ext cx="987130" cy="369332"/>
+          </a:xfrm>
+          <a:prstGeom prst="rect">
+            <a:avLst/>
+          </a:prstGeom>
+          <a:noFill/>
+        </p:spPr>
+        <p:txBody>
+          <a:bodyPr wrap="none" rtlCol="0">
+            <a:spAutoFit/>
+          </a:bodyPr>
+          <a:lstStyle/>
+          <a:p>
+            <a:r>
+              <a:rPr lang="fr-FR" dirty="0" smtClean="0"/>
+              <a:t>: Bouton</a:t>
+            </a:r>
+            <a:endParaRPr lang="fr-FR" dirty="0"/>
+          </a:p>
+        </p:txBody>
+      </p:sp>
+      <p:sp>
+        <p:nvSpPr>
+          <p:cNvPr id="25" name="ZoneTexte 24"/>
+          <p:cNvSpPr txBox="1"/>
+          <p:nvPr/>
+        </p:nvSpPr>
+        <p:spPr>
+          <a:xfrm>
+            <a:off x="6588224" y="6093296"/>
+            <a:ext cx="1582677" cy="369332"/>
+          </a:xfrm>
+          <a:prstGeom prst="rect">
+            <a:avLst/>
+          </a:prstGeom>
+          <a:noFill/>
+        </p:spPr>
+        <p:txBody>
+          <a:bodyPr wrap="none" rtlCol="0">
+            <a:spAutoFit/>
+          </a:bodyPr>
+          <a:lstStyle/>
+          <a:p>
+            <a:r>
+              <a:rPr lang="fr-FR" dirty="0" smtClean="0"/>
+              <a:t>: Zone de texte</a:t>
+            </a:r>
+            <a:endParaRPr lang="fr-FR" dirty="0"/>
+          </a:p>
+        </p:txBody>
+      </p:sp>
+      <p:sp>
+        <p:nvSpPr>
+          <p:cNvPr id="26" name="ZoneTexte 25"/>
+          <p:cNvSpPr txBox="1"/>
+          <p:nvPr/>
+        </p:nvSpPr>
+        <p:spPr>
+          <a:xfrm>
+            <a:off x="2483768" y="0"/>
+            <a:ext cx="3874650" cy="369332"/>
+          </a:xfrm>
+          <a:prstGeom prst="rect">
+            <a:avLst/>
+          </a:prstGeom>
+          <a:noFill/>
+        </p:spPr>
+        <p:txBody>
+          <a:bodyPr wrap="none" rtlCol="0">
+            <a:spAutoFit/>
+          </a:bodyPr>
+          <a:lstStyle/>
+          <a:p>
+            <a:r>
+              <a:rPr lang="fr-FR" dirty="0" smtClean="0"/>
+              <a:t>Permet d’accéder aux différentes pages</a:t>
+            </a:r>
+            <a:endParaRPr lang="fr-FR" dirty="0"/>
+          </a:p>
+        </p:txBody>
+      </p:sp>
+      <p:cxnSp>
+        <p:nvCxnSpPr>
+          <p:cNvPr id="28" name="Connecteur droit avec flèche 27"/>
+          <p:cNvCxnSpPr/>
+          <p:nvPr/>
+        </p:nvCxnSpPr>
+        <p:spPr>
+          <a:xfrm flipH="1">
+            <a:off x="1043608" y="332656"/>
+            <a:ext cx="1584176" cy="432048"/>
+          </a:xfrm>
+          <a:prstGeom prst="straightConnector1">
+            <a:avLst/>
+          </a:prstGeom>
+          <a:ln>
+            <a:tailEnd type="arrow"/>
+          </a:ln>
+        </p:spPr>
+        <p:style>
+          <a:lnRef idx="1">
+            <a:schemeClr val="dk1"/>
+          </a:lnRef>
+          <a:fillRef idx="0">
+            <a:schemeClr val="dk1"/>
+          </a:fillRef>
+          <a:effectRef idx="0">
+            <a:schemeClr val="dk1"/>
+          </a:effectRef>
+          <a:fontRef idx="minor">
+            <a:schemeClr val="tx1"/>
+          </a:fontRef>
+        </p:style>
+      </p:cxnSp>
+      <p:cxnSp>
+        <p:nvCxnSpPr>
+          <p:cNvPr id="30" name="Connecteur droit avec flèche 29"/>
+          <p:cNvCxnSpPr/>
+          <p:nvPr/>
+        </p:nvCxnSpPr>
+        <p:spPr>
+          <a:xfrm flipH="1">
+            <a:off x="2051720" y="332656"/>
+            <a:ext cx="936104" cy="432048"/>
+          </a:xfrm>
+          <a:prstGeom prst="straightConnector1">
+            <a:avLst/>
+          </a:prstGeom>
+          <a:ln>
+            <a:tailEnd type="arrow"/>
+          </a:ln>
+        </p:spPr>
+        <p:style>
+          <a:lnRef idx="1">
+            <a:schemeClr val="dk1"/>
+          </a:lnRef>
+          <a:fillRef idx="0">
+            <a:schemeClr val="dk1"/>
+          </a:fillRef>
+          <a:effectRef idx="0">
+            <a:schemeClr val="dk1"/>
+          </a:effectRef>
+          <a:fontRef idx="minor">
+            <a:schemeClr val="tx1"/>
+          </a:fontRef>
+        </p:style>
+      </p:cxnSp>
+      <p:cxnSp>
+        <p:nvCxnSpPr>
+          <p:cNvPr id="32" name="Connecteur droit avec flèche 31"/>
+          <p:cNvCxnSpPr/>
+          <p:nvPr/>
+        </p:nvCxnSpPr>
+        <p:spPr>
+          <a:xfrm flipH="1">
+            <a:off x="2915816" y="332656"/>
+            <a:ext cx="504056" cy="432048"/>
+          </a:xfrm>
+          <a:prstGeom prst="straightConnector1">
+            <a:avLst/>
+          </a:prstGeom>
+          <a:ln>
+            <a:tailEnd type="arrow"/>
+          </a:ln>
+        </p:spPr>
+        <p:style>
+          <a:lnRef idx="1">
+            <a:schemeClr val="dk1"/>
+          </a:lnRef>
+          <a:fillRef idx="0">
+            <a:schemeClr val="dk1"/>
+          </a:fillRef>
+          <a:effectRef idx="0">
+            <a:schemeClr val="dk1"/>
+          </a:effectRef>
+          <a:fontRef idx="minor">
+            <a:schemeClr val="tx1"/>
+          </a:fontRef>
+        </p:style>
+      </p:cxnSp>
+      <p:cxnSp>
+        <p:nvCxnSpPr>
+          <p:cNvPr id="34" name="Connecteur droit avec flèche 33"/>
+          <p:cNvCxnSpPr/>
+          <p:nvPr/>
+        </p:nvCxnSpPr>
+        <p:spPr>
+          <a:xfrm>
+            <a:off x="5364088" y="332656"/>
+            <a:ext cx="504056" cy="432048"/>
+          </a:xfrm>
+          <a:prstGeom prst="straightConnector1">
+            <a:avLst/>
+          </a:prstGeom>
+          <a:ln>
+            <a:tailEnd type="arrow"/>
+          </a:ln>
+        </p:spPr>
+        <p:style>
+          <a:lnRef idx="1">
+            <a:schemeClr val="dk1"/>
+          </a:lnRef>
+          <a:fillRef idx="0">
+            <a:schemeClr val="dk1"/>
+          </a:fillRef>
+          <a:effectRef idx="0">
+            <a:schemeClr val="dk1"/>
+          </a:effectRef>
+          <a:fontRef idx="minor">
+            <a:schemeClr val="tx1"/>
+          </a:fontRef>
+        </p:style>
+      </p:cxnSp>
+      <p:cxnSp>
+        <p:nvCxnSpPr>
+          <p:cNvPr id="36" name="Connecteur droit avec flèche 35"/>
+          <p:cNvCxnSpPr/>
+          <p:nvPr/>
+        </p:nvCxnSpPr>
+        <p:spPr>
+          <a:xfrm>
+            <a:off x="5796136" y="332656"/>
+            <a:ext cx="1152128" cy="504056"/>
+          </a:xfrm>
+          <a:prstGeom prst="straightConnector1">
+            <a:avLst/>
+          </a:prstGeom>
+          <a:ln>
+            <a:tailEnd type="arrow"/>
+          </a:ln>
+        </p:spPr>
+        <p:style>
+          <a:lnRef idx="1">
+            <a:schemeClr val="dk1"/>
+          </a:lnRef>
+          <a:fillRef idx="0">
+            <a:schemeClr val="dk1"/>
+          </a:fillRef>
+          <a:effectRef idx="0">
+            <a:schemeClr val="dk1"/>
+          </a:effectRef>
+          <a:fontRef idx="minor">
+            <a:schemeClr val="tx1"/>
+          </a:fontRef>
+        </p:style>
+      </p:cxnSp>
+      <p:cxnSp>
+        <p:nvCxnSpPr>
+          <p:cNvPr id="41" name="Connecteur droit avec flèche 40"/>
+          <p:cNvCxnSpPr/>
+          <p:nvPr/>
+        </p:nvCxnSpPr>
+        <p:spPr>
+          <a:xfrm flipH="1">
+            <a:off x="8172400" y="548680"/>
+            <a:ext cx="504056" cy="288032"/>
+          </a:xfrm>
+          <a:prstGeom prst="straightConnector1">
+            <a:avLst/>
+          </a:prstGeom>
+          <a:ln>
+            <a:tailEnd type="arrow"/>
+          </a:ln>
+        </p:spPr>
+        <p:style>
+          <a:lnRef idx="1">
+            <a:schemeClr val="dk1"/>
+          </a:lnRef>
+          <a:fillRef idx="0">
+            <a:schemeClr val="dk1"/>
+          </a:fillRef>
+          <a:effectRef idx="0">
+            <a:schemeClr val="dk1"/>
+          </a:effectRef>
+          <a:fontRef idx="minor">
+            <a:schemeClr val="tx1"/>
+          </a:fontRef>
+        </p:style>
+      </p:cxnSp>
+      <p:sp>
+        <p:nvSpPr>
+          <p:cNvPr id="46" name="ZoneTexte 45"/>
+          <p:cNvSpPr txBox="1"/>
+          <p:nvPr/>
+        </p:nvSpPr>
+        <p:spPr>
+          <a:xfrm>
+            <a:off x="6899218" y="0"/>
+            <a:ext cx="2244782" cy="584775"/>
+          </a:xfrm>
+          <a:prstGeom prst="rect">
+            <a:avLst/>
+          </a:prstGeom>
+          <a:noFill/>
+        </p:spPr>
+        <p:txBody>
+          <a:bodyPr wrap="none" rtlCol="0">
+            <a:spAutoFit/>
+          </a:bodyPr>
+          <a:lstStyle/>
+          <a:p>
+            <a:r>
+              <a:rPr lang="fr-FR" sz="1600" dirty="0" smtClean="0"/>
+              <a:t>Active un onglet avec </a:t>
+            </a:r>
+          </a:p>
+          <a:p>
+            <a:r>
+              <a:rPr lang="fr-FR" sz="1600" dirty="0" smtClean="0"/>
+              <a:t>‘Profil’ et ‘Déconnection’</a:t>
+            </a:r>
+            <a:endParaRPr lang="fr-FR" sz="1600" dirty="0"/>
+          </a:p>
+        </p:txBody>
+      </p:sp>
     </p:spTree>
   </p:cSld>
   <p:clrMapOvr>
@@ -4407,8 +4900,8 @@
         </p:blipFill>
         <p:spPr>
           <a:xfrm>
-            <a:off x="0" y="487325"/>
-            <a:ext cx="9144000" cy="5883349"/>
+            <a:off x="467544" y="548680"/>
+            <a:ext cx="8064896" cy="5189041"/>
           </a:xfrm>
           <a:prstGeom prst="rect">
             <a:avLst/>
@@ -4429,6 +4922,462 @@
           </a:effectLst>
         </p:spPr>
       </p:pic>
+      <p:sp>
+        <p:nvSpPr>
+          <p:cNvPr id="5" name="Rectangle 4"/>
+          <p:cNvSpPr/>
+          <p:nvPr/>
+        </p:nvSpPr>
+        <p:spPr>
+          <a:xfrm>
+            <a:off x="971600" y="6093296"/>
+            <a:ext cx="648072" cy="288032"/>
+          </a:xfrm>
+          <a:prstGeom prst="rect">
+            <a:avLst/>
+          </a:prstGeom>
+          <a:solidFill>
+            <a:srgbClr val="00B050"/>
+          </a:solidFill>
+          <a:ln>
+            <a:solidFill>
+              <a:schemeClr val="tx1"/>
+            </a:solidFill>
+          </a:ln>
+        </p:spPr>
+        <p:style>
+          <a:lnRef idx="3">
+            <a:schemeClr val="lt1"/>
+          </a:lnRef>
+          <a:fillRef idx="1">
+            <a:schemeClr val="accent3"/>
+          </a:fillRef>
+          <a:effectRef idx="1">
+            <a:schemeClr val="accent3"/>
+          </a:effectRef>
+          <a:fontRef idx="minor">
+            <a:schemeClr val="lt1"/>
+          </a:fontRef>
+        </p:style>
+        <p:txBody>
+          <a:bodyPr rtlCol="0" anchor="ctr"/>
+          <a:lstStyle/>
+          <a:p>
+            <a:pPr algn="ctr"/>
+            <a:endParaRPr lang="fr-FR" dirty="0"/>
+          </a:p>
+        </p:txBody>
+      </p:sp>
+      <p:sp>
+        <p:nvSpPr>
+          <p:cNvPr id="6" name="ZoneTexte 5"/>
+          <p:cNvSpPr txBox="1"/>
+          <p:nvPr/>
+        </p:nvSpPr>
+        <p:spPr>
+          <a:xfrm>
+            <a:off x="1619672" y="6021288"/>
+            <a:ext cx="875240" cy="369332"/>
+          </a:xfrm>
+          <a:prstGeom prst="rect">
+            <a:avLst/>
+          </a:prstGeom>
+          <a:noFill/>
+        </p:spPr>
+        <p:txBody>
+          <a:bodyPr wrap="none" rtlCol="0">
+            <a:spAutoFit/>
+          </a:bodyPr>
+          <a:lstStyle/>
+          <a:p>
+            <a:r>
+              <a:rPr lang="fr-FR" dirty="0" smtClean="0"/>
+              <a:t>: Image</a:t>
+            </a:r>
+            <a:endParaRPr lang="fr-FR" dirty="0"/>
+          </a:p>
+        </p:txBody>
+      </p:sp>
+      <p:sp>
+        <p:nvSpPr>
+          <p:cNvPr id="7" name="Rectangle 6"/>
+          <p:cNvSpPr/>
+          <p:nvPr/>
+        </p:nvSpPr>
+        <p:spPr>
+          <a:xfrm>
+            <a:off x="3635896" y="6093296"/>
+            <a:ext cx="648072" cy="288032"/>
+          </a:xfrm>
+          <a:prstGeom prst="rect">
+            <a:avLst/>
+          </a:prstGeom>
+          <a:solidFill>
+            <a:srgbClr val="FF0000"/>
+          </a:solidFill>
+          <a:ln>
+            <a:solidFill>
+              <a:schemeClr val="tx1"/>
+            </a:solidFill>
+          </a:ln>
+        </p:spPr>
+        <p:style>
+          <a:lnRef idx="3">
+            <a:schemeClr val="lt1"/>
+          </a:lnRef>
+          <a:fillRef idx="1">
+            <a:schemeClr val="accent3"/>
+          </a:fillRef>
+          <a:effectRef idx="1">
+            <a:schemeClr val="accent3"/>
+          </a:effectRef>
+          <a:fontRef idx="minor">
+            <a:schemeClr val="lt1"/>
+          </a:fontRef>
+        </p:style>
+        <p:txBody>
+          <a:bodyPr rtlCol="0" anchor="ctr"/>
+          <a:lstStyle/>
+          <a:p>
+            <a:pPr algn="ctr"/>
+            <a:endParaRPr lang="fr-FR" dirty="0"/>
+          </a:p>
+        </p:txBody>
+      </p:sp>
+      <p:sp>
+        <p:nvSpPr>
+          <p:cNvPr id="8" name="Rectangle 7"/>
+          <p:cNvSpPr/>
+          <p:nvPr/>
+        </p:nvSpPr>
+        <p:spPr>
+          <a:xfrm>
+            <a:off x="6012160" y="6093296"/>
+            <a:ext cx="648072" cy="288032"/>
+          </a:xfrm>
+          <a:prstGeom prst="rect">
+            <a:avLst/>
+          </a:prstGeom>
+          <a:solidFill>
+            <a:srgbClr val="00B0F0"/>
+          </a:solidFill>
+          <a:ln>
+            <a:solidFill>
+              <a:schemeClr val="tx1"/>
+            </a:solidFill>
+          </a:ln>
+        </p:spPr>
+        <p:style>
+          <a:lnRef idx="3">
+            <a:schemeClr val="lt1"/>
+          </a:lnRef>
+          <a:fillRef idx="1">
+            <a:schemeClr val="accent3"/>
+          </a:fillRef>
+          <a:effectRef idx="1">
+            <a:schemeClr val="accent3"/>
+          </a:effectRef>
+          <a:fontRef idx="minor">
+            <a:schemeClr val="lt1"/>
+          </a:fontRef>
+        </p:style>
+        <p:txBody>
+          <a:bodyPr rtlCol="0" anchor="ctr"/>
+          <a:lstStyle/>
+          <a:p>
+            <a:pPr algn="ctr"/>
+            <a:endParaRPr lang="fr-FR" dirty="0"/>
+          </a:p>
+        </p:txBody>
+      </p:sp>
+      <p:sp>
+        <p:nvSpPr>
+          <p:cNvPr id="9" name="ZoneTexte 8"/>
+          <p:cNvSpPr txBox="1"/>
+          <p:nvPr/>
+        </p:nvSpPr>
+        <p:spPr>
+          <a:xfrm>
+            <a:off x="4283968" y="6021288"/>
+            <a:ext cx="987130" cy="369332"/>
+          </a:xfrm>
+          <a:prstGeom prst="rect">
+            <a:avLst/>
+          </a:prstGeom>
+          <a:noFill/>
+        </p:spPr>
+        <p:txBody>
+          <a:bodyPr wrap="none" rtlCol="0">
+            <a:spAutoFit/>
+          </a:bodyPr>
+          <a:lstStyle/>
+          <a:p>
+            <a:r>
+              <a:rPr lang="fr-FR" dirty="0" smtClean="0"/>
+              <a:t>: Bouton</a:t>
+            </a:r>
+            <a:endParaRPr lang="fr-FR" dirty="0"/>
+          </a:p>
+        </p:txBody>
+      </p:sp>
+      <p:sp>
+        <p:nvSpPr>
+          <p:cNvPr id="10" name="ZoneTexte 9"/>
+          <p:cNvSpPr txBox="1"/>
+          <p:nvPr/>
+        </p:nvSpPr>
+        <p:spPr>
+          <a:xfrm>
+            <a:off x="6660232" y="6021288"/>
+            <a:ext cx="1582677" cy="369332"/>
+          </a:xfrm>
+          <a:prstGeom prst="rect">
+            <a:avLst/>
+          </a:prstGeom>
+          <a:noFill/>
+        </p:spPr>
+        <p:txBody>
+          <a:bodyPr wrap="none" rtlCol="0">
+            <a:spAutoFit/>
+          </a:bodyPr>
+          <a:lstStyle/>
+          <a:p>
+            <a:r>
+              <a:rPr lang="fr-FR" dirty="0" smtClean="0"/>
+              <a:t>: Zone de texte</a:t>
+            </a:r>
+            <a:endParaRPr lang="fr-FR" dirty="0"/>
+          </a:p>
+        </p:txBody>
+      </p:sp>
+      <p:sp>
+        <p:nvSpPr>
+          <p:cNvPr id="11" name="ZoneTexte 10"/>
+          <p:cNvSpPr txBox="1"/>
+          <p:nvPr/>
+        </p:nvSpPr>
+        <p:spPr>
+          <a:xfrm>
+            <a:off x="2483768" y="0"/>
+            <a:ext cx="3874650" cy="369332"/>
+          </a:xfrm>
+          <a:prstGeom prst="rect">
+            <a:avLst/>
+          </a:prstGeom>
+          <a:noFill/>
+        </p:spPr>
+        <p:txBody>
+          <a:bodyPr wrap="none" rtlCol="0">
+            <a:spAutoFit/>
+          </a:bodyPr>
+          <a:lstStyle/>
+          <a:p>
+            <a:r>
+              <a:rPr lang="fr-FR" dirty="0" smtClean="0"/>
+              <a:t>Permet d’accéder aux différentes pages</a:t>
+            </a:r>
+            <a:endParaRPr lang="fr-FR" dirty="0"/>
+          </a:p>
+        </p:txBody>
+      </p:sp>
+      <p:cxnSp>
+        <p:nvCxnSpPr>
+          <p:cNvPr id="12" name="Connecteur droit avec flèche 11"/>
+          <p:cNvCxnSpPr/>
+          <p:nvPr/>
+        </p:nvCxnSpPr>
+        <p:spPr>
+          <a:xfrm flipH="1">
+            <a:off x="1043608" y="332656"/>
+            <a:ext cx="1584176" cy="432048"/>
+          </a:xfrm>
+          <a:prstGeom prst="straightConnector1">
+            <a:avLst/>
+          </a:prstGeom>
+          <a:ln>
+            <a:tailEnd type="arrow"/>
+          </a:ln>
+        </p:spPr>
+        <p:style>
+          <a:lnRef idx="1">
+            <a:schemeClr val="dk1"/>
+          </a:lnRef>
+          <a:fillRef idx="0">
+            <a:schemeClr val="dk1"/>
+          </a:fillRef>
+          <a:effectRef idx="0">
+            <a:schemeClr val="dk1"/>
+          </a:effectRef>
+          <a:fontRef idx="minor">
+            <a:schemeClr val="tx1"/>
+          </a:fontRef>
+        </p:style>
+      </p:cxnSp>
+      <p:cxnSp>
+        <p:nvCxnSpPr>
+          <p:cNvPr id="13" name="Connecteur droit avec flèche 12"/>
+          <p:cNvCxnSpPr/>
+          <p:nvPr/>
+        </p:nvCxnSpPr>
+        <p:spPr>
+          <a:xfrm flipH="1">
+            <a:off x="2051720" y="332656"/>
+            <a:ext cx="936104" cy="432048"/>
+          </a:xfrm>
+          <a:prstGeom prst="straightConnector1">
+            <a:avLst/>
+          </a:prstGeom>
+          <a:ln>
+            <a:tailEnd type="arrow"/>
+          </a:ln>
+        </p:spPr>
+        <p:style>
+          <a:lnRef idx="1">
+            <a:schemeClr val="dk1"/>
+          </a:lnRef>
+          <a:fillRef idx="0">
+            <a:schemeClr val="dk1"/>
+          </a:fillRef>
+          <a:effectRef idx="0">
+            <a:schemeClr val="dk1"/>
+          </a:effectRef>
+          <a:fontRef idx="minor">
+            <a:schemeClr val="tx1"/>
+          </a:fontRef>
+        </p:style>
+      </p:cxnSp>
+      <p:cxnSp>
+        <p:nvCxnSpPr>
+          <p:cNvPr id="14" name="Connecteur droit avec flèche 13"/>
+          <p:cNvCxnSpPr/>
+          <p:nvPr/>
+        </p:nvCxnSpPr>
+        <p:spPr>
+          <a:xfrm flipH="1">
+            <a:off x="2915816" y="332656"/>
+            <a:ext cx="504056" cy="432048"/>
+          </a:xfrm>
+          <a:prstGeom prst="straightConnector1">
+            <a:avLst/>
+          </a:prstGeom>
+          <a:ln>
+            <a:tailEnd type="arrow"/>
+          </a:ln>
+        </p:spPr>
+        <p:style>
+          <a:lnRef idx="1">
+            <a:schemeClr val="dk1"/>
+          </a:lnRef>
+          <a:fillRef idx="0">
+            <a:schemeClr val="dk1"/>
+          </a:fillRef>
+          <a:effectRef idx="0">
+            <a:schemeClr val="dk1"/>
+          </a:effectRef>
+          <a:fontRef idx="minor">
+            <a:schemeClr val="tx1"/>
+          </a:fontRef>
+        </p:style>
+      </p:cxnSp>
+      <p:cxnSp>
+        <p:nvCxnSpPr>
+          <p:cNvPr id="15" name="Connecteur droit avec flèche 14"/>
+          <p:cNvCxnSpPr/>
+          <p:nvPr/>
+        </p:nvCxnSpPr>
+        <p:spPr>
+          <a:xfrm>
+            <a:off x="5364088" y="332656"/>
+            <a:ext cx="504056" cy="432048"/>
+          </a:xfrm>
+          <a:prstGeom prst="straightConnector1">
+            <a:avLst/>
+          </a:prstGeom>
+          <a:ln>
+            <a:tailEnd type="arrow"/>
+          </a:ln>
+        </p:spPr>
+        <p:style>
+          <a:lnRef idx="1">
+            <a:schemeClr val="dk1"/>
+          </a:lnRef>
+          <a:fillRef idx="0">
+            <a:schemeClr val="dk1"/>
+          </a:fillRef>
+          <a:effectRef idx="0">
+            <a:schemeClr val="dk1"/>
+          </a:effectRef>
+          <a:fontRef idx="minor">
+            <a:schemeClr val="tx1"/>
+          </a:fontRef>
+        </p:style>
+      </p:cxnSp>
+      <p:cxnSp>
+        <p:nvCxnSpPr>
+          <p:cNvPr id="16" name="Connecteur droit avec flèche 15"/>
+          <p:cNvCxnSpPr/>
+          <p:nvPr/>
+        </p:nvCxnSpPr>
+        <p:spPr>
+          <a:xfrm>
+            <a:off x="5796136" y="332656"/>
+            <a:ext cx="1152128" cy="504056"/>
+          </a:xfrm>
+          <a:prstGeom prst="straightConnector1">
+            <a:avLst/>
+          </a:prstGeom>
+          <a:ln>
+            <a:tailEnd type="arrow"/>
+          </a:ln>
+        </p:spPr>
+        <p:style>
+          <a:lnRef idx="1">
+            <a:schemeClr val="dk1"/>
+          </a:lnRef>
+          <a:fillRef idx="0">
+            <a:schemeClr val="dk1"/>
+          </a:fillRef>
+          <a:effectRef idx="0">
+            <a:schemeClr val="dk1"/>
+          </a:effectRef>
+          <a:fontRef idx="minor">
+            <a:schemeClr val="tx1"/>
+          </a:fontRef>
+        </p:style>
+      </p:cxnSp>
+      <p:cxnSp>
+        <p:nvCxnSpPr>
+          <p:cNvPr id="17" name="Connecteur droit avec flèche 16"/>
+          <p:cNvCxnSpPr/>
+          <p:nvPr/>
+        </p:nvCxnSpPr>
+        <p:spPr>
+          <a:xfrm>
+            <a:off x="6156176" y="260648"/>
+            <a:ext cx="1656184" cy="576064"/>
+          </a:xfrm>
+          <a:prstGeom prst="straightConnector1">
+            <a:avLst/>
+          </a:prstGeom>
+          <a:ln>
+            <a:tailEnd type="arrow"/>
+          </a:ln>
+        </p:spPr>
+        <p:style>
+          <a:lnRef idx="1">
+            <a:schemeClr val="dk1"/>
+          </a:lnRef>
+          <a:fillRef idx="0">
+            <a:schemeClr val="dk1"/>
+          </a:fillRef>
+          <a:effectRef idx="0">
+            <a:schemeClr val="dk1"/>
+          </a:effectRef>
+          <a:fontRef idx="minor">
+            <a:schemeClr val="tx1"/>
+          </a:fontRef>
+        </p:style>
+      </p:cxnSp>
     </p:spTree>
   </p:cSld>
   <p:clrMapOvr>
@@ -4454,47 +5403,9 @@
           <a:chExt cx="0" cy="0"/>
         </a:xfrm>
       </p:grpSpPr>
-      <p:sp>
-        <p:nvSpPr>
-          <p:cNvPr id="2" name="Titre 1"/>
-          <p:cNvSpPr>
-            <a:spLocks noGrp="1"/>
-          </p:cNvSpPr>
-          <p:nvPr>
-            <p:ph type="ctrTitle"/>
-          </p:nvPr>
-        </p:nvSpPr>
-        <p:spPr/>
-        <p:txBody>
-          <a:bodyPr/>
-          <a:lstStyle/>
-          <a:p>
-            <a:endParaRPr lang="fr-FR"/>
-          </a:p>
-        </p:txBody>
-      </p:sp>
-      <p:sp>
-        <p:nvSpPr>
-          <p:cNvPr id="3" name="Sous-titre 2"/>
-          <p:cNvSpPr>
-            <a:spLocks noGrp="1"/>
-          </p:cNvSpPr>
-          <p:nvPr>
-            <p:ph type="subTitle" idx="1"/>
-          </p:nvPr>
-        </p:nvSpPr>
-        <p:spPr/>
-        <p:txBody>
-          <a:bodyPr/>
-          <a:lstStyle/>
-          <a:p>
-            <a:endParaRPr lang="fr-FR"/>
-          </a:p>
-        </p:txBody>
-      </p:sp>
       <p:pic>
         <p:nvPicPr>
-          <p:cNvPr id="4" name="Image 3" descr="Accueil site.png"/>
+          <p:cNvPr id="4" name="Image 3" descr="Mon réseau.png"/>
           <p:cNvPicPr>
             <a:picLocks noChangeAspect="1"/>
           </p:cNvPicPr>
@@ -4508,8 +5419,8 @@
         </p:blipFill>
         <p:spPr>
           <a:xfrm>
-            <a:off x="683568" y="1196752"/>
-            <a:ext cx="7740352" cy="4975078"/>
+            <a:off x="323528" y="404664"/>
+            <a:ext cx="8265229" cy="5317938"/>
           </a:xfrm>
           <a:prstGeom prst="rect">
             <a:avLst/>
@@ -4530,51 +5441,62 @@
           </a:effectLst>
         </p:spPr>
       </p:pic>
-      <p:cxnSp>
-        <p:nvCxnSpPr>
-          <p:cNvPr id="6" name="Connecteur droit avec flèche 5"/>
-          <p:cNvCxnSpPr>
-            <a:stCxn id="12" idx="2"/>
-          </p:cNvCxnSpPr>
-          <p:nvPr/>
-        </p:nvCxnSpPr>
-        <p:spPr>
-          <a:xfrm>
-            <a:off x="902170" y="1123003"/>
-            <a:ext cx="213446" cy="289773"/>
-          </a:xfrm>
-          <a:prstGeom prst="straightConnector1">
-            <a:avLst/>
-          </a:prstGeom>
+      <p:sp>
+        <p:nvSpPr>
+          <p:cNvPr id="5" name="Rectangle 4"/>
+          <p:cNvSpPr/>
+          <p:nvPr/>
+        </p:nvSpPr>
+        <p:spPr>
+          <a:xfrm>
+            <a:off x="899592" y="6093296"/>
+            <a:ext cx="648072" cy="288032"/>
+          </a:xfrm>
+          <a:prstGeom prst="rect">
+            <a:avLst/>
+          </a:prstGeom>
+          <a:solidFill>
+            <a:srgbClr val="00B050"/>
+          </a:solidFill>
           <a:ln>
-            <a:tailEnd type="arrow"/>
+            <a:solidFill>
+              <a:schemeClr val="tx1"/>
+            </a:solidFill>
           </a:ln>
         </p:spPr>
         <p:style>
-          <a:lnRef idx="1">
-            <a:schemeClr val="dk1"/>
+          <a:lnRef idx="3">
+            <a:schemeClr val="lt1"/>
           </a:lnRef>
-          <a:fillRef idx="0">
-            <a:schemeClr val="dk1"/>
+          <a:fillRef idx="1">
+            <a:schemeClr val="accent3"/>
           </a:fillRef>
-          <a:effectRef idx="0">
-            <a:schemeClr val="dk1"/>
+          <a:effectRef idx="1">
+            <a:schemeClr val="accent3"/>
           </a:effectRef>
           <a:fontRef idx="minor">
-            <a:schemeClr val="tx1"/>
+            <a:schemeClr val="lt1"/>
           </a:fontRef>
         </p:style>
-      </p:cxnSp>
-      <p:sp>
-        <p:nvSpPr>
-          <p:cNvPr id="12" name="ZoneTexte 11"/>
+        <p:txBody>
+          <a:bodyPr rtlCol="0" anchor="ctr"/>
+          <a:lstStyle/>
+          <a:p>
+            <a:pPr algn="ctr"/>
+            <a:endParaRPr lang="fr-FR" dirty="0"/>
+          </a:p>
+        </p:txBody>
+      </p:sp>
+      <p:sp>
+        <p:nvSpPr>
+          <p:cNvPr id="6" name="ZoneTexte 5"/>
           <p:cNvSpPr txBox="1"/>
           <p:nvPr/>
         </p:nvSpPr>
         <p:spPr>
           <a:xfrm>
-            <a:off x="0" y="476672"/>
-            <a:ext cx="1804340" cy="646331"/>
+            <a:off x="1547664" y="6021288"/>
+            <a:ext cx="875240" cy="369332"/>
           </a:xfrm>
           <a:prstGeom prst="rect">
             <a:avLst/>
@@ -4589,13 +5511,7 @@
           <a:p>
             <a:r>
               <a:rPr lang="fr-FR" dirty="0" smtClean="0"/>
-              <a:t>Renvoie sur cette</a:t>
-            </a:r>
-          </a:p>
-          <a:p>
-            <a:r>
-              <a:rPr lang="fr-FR" dirty="0" smtClean="0"/>
-              <a:t>page</a:t>
+              <a:t>: Image</a:t>
             </a:r>
             <a:endParaRPr lang="fr-FR" dirty="0"/>
           </a:p>
@@ -4603,14 +5519,106 @@
       </p:sp>
       <p:sp>
         <p:nvSpPr>
-          <p:cNvPr id="14" name="ZoneTexte 13"/>
+          <p:cNvPr id="7" name="Rectangle 6"/>
+          <p:cNvSpPr/>
+          <p:nvPr/>
+        </p:nvSpPr>
+        <p:spPr>
+          <a:xfrm>
+            <a:off x="3563888" y="6093296"/>
+            <a:ext cx="648072" cy="288032"/>
+          </a:xfrm>
+          <a:prstGeom prst="rect">
+            <a:avLst/>
+          </a:prstGeom>
+          <a:solidFill>
+            <a:srgbClr val="FF0000"/>
+          </a:solidFill>
+          <a:ln>
+            <a:solidFill>
+              <a:schemeClr val="tx1"/>
+            </a:solidFill>
+          </a:ln>
+        </p:spPr>
+        <p:style>
+          <a:lnRef idx="3">
+            <a:schemeClr val="lt1"/>
+          </a:lnRef>
+          <a:fillRef idx="1">
+            <a:schemeClr val="accent3"/>
+          </a:fillRef>
+          <a:effectRef idx="1">
+            <a:schemeClr val="accent3"/>
+          </a:effectRef>
+          <a:fontRef idx="minor">
+            <a:schemeClr val="lt1"/>
+          </a:fontRef>
+        </p:style>
+        <p:txBody>
+          <a:bodyPr rtlCol="0" anchor="ctr"/>
+          <a:lstStyle/>
+          <a:p>
+            <a:pPr algn="ctr"/>
+            <a:endParaRPr lang="fr-FR" dirty="0"/>
+          </a:p>
+        </p:txBody>
+      </p:sp>
+      <p:sp>
+        <p:nvSpPr>
+          <p:cNvPr id="8" name="Rectangle 7"/>
+          <p:cNvSpPr/>
+          <p:nvPr/>
+        </p:nvSpPr>
+        <p:spPr>
+          <a:xfrm>
+            <a:off x="5940152" y="6093296"/>
+            <a:ext cx="648072" cy="288032"/>
+          </a:xfrm>
+          <a:prstGeom prst="rect">
+            <a:avLst/>
+          </a:prstGeom>
+          <a:solidFill>
+            <a:srgbClr val="00B0F0"/>
+          </a:solidFill>
+          <a:ln>
+            <a:solidFill>
+              <a:schemeClr val="tx1"/>
+            </a:solidFill>
+          </a:ln>
+        </p:spPr>
+        <p:style>
+          <a:lnRef idx="3">
+            <a:schemeClr val="lt1"/>
+          </a:lnRef>
+          <a:fillRef idx="1">
+            <a:schemeClr val="accent3"/>
+          </a:fillRef>
+          <a:effectRef idx="1">
+            <a:schemeClr val="accent3"/>
+          </a:effectRef>
+          <a:fontRef idx="minor">
+            <a:schemeClr val="lt1"/>
+          </a:fontRef>
+        </p:style>
+        <p:txBody>
+          <a:bodyPr rtlCol="0" anchor="ctr"/>
+          <a:lstStyle/>
+          <a:p>
+            <a:pPr algn="ctr"/>
+            <a:endParaRPr lang="fr-FR" dirty="0"/>
+          </a:p>
+        </p:txBody>
+      </p:sp>
+      <p:sp>
+        <p:nvSpPr>
+          <p:cNvPr id="9" name="ZoneTexte 8"/>
           <p:cNvSpPr txBox="1"/>
           <p:nvPr/>
         </p:nvSpPr>
         <p:spPr>
           <a:xfrm>
-            <a:off x="1619672" y="0"/>
-            <a:ext cx="2053063" cy="646331"/>
+            <a:off x="4211960" y="6021288"/>
+            <a:ext cx="987130" cy="369332"/>
           </a:xfrm>
           <a:prstGeom prst="rect">
             <a:avLst/>
@@ -4625,63 +5633,22 @@
           <a:p>
             <a:r>
               <a:rPr lang="fr-FR" dirty="0" smtClean="0"/>
-              <a:t>Renvoie sur la page </a:t>
-            </a:r>
-          </a:p>
-          <a:p>
-            <a:r>
-              <a:rPr lang="fr-FR" dirty="0" smtClean="0"/>
-              <a:t>‘Mon réseau’</a:t>
+              <a:t>: Bouton</a:t>
             </a:r>
             <a:endParaRPr lang="fr-FR" dirty="0"/>
           </a:p>
         </p:txBody>
       </p:sp>
-      <p:cxnSp>
-        <p:nvCxnSpPr>
-          <p:cNvPr id="18" name="Connecteur droit avec flèche 17"/>
-          <p:cNvCxnSpPr>
-            <a:stCxn id="14" idx="2"/>
-          </p:cNvCxnSpPr>
-          <p:nvPr/>
-        </p:nvCxnSpPr>
-        <p:spPr>
-          <a:xfrm flipH="1">
-            <a:off x="2123728" y="646331"/>
-            <a:ext cx="522476" cy="766445"/>
-          </a:xfrm>
-          <a:prstGeom prst="straightConnector1">
-            <a:avLst/>
-          </a:prstGeom>
-          <a:ln>
-            <a:tailEnd type="arrow"/>
-          </a:ln>
-        </p:spPr>
-        <p:style>
-          <a:lnRef idx="1">
-            <a:schemeClr val="dk1"/>
-          </a:lnRef>
-          <a:fillRef idx="0">
-            <a:schemeClr val="dk1"/>
-          </a:fillRef>
-          <a:effectRef idx="0">
-            <a:schemeClr val="dk1"/>
-          </a:effectRef>
-          <a:fontRef idx="minor">
-            <a:schemeClr val="tx1"/>
-          </a:fontRef>
-        </p:style>
-      </p:cxnSp>
-      <p:sp>
-        <p:nvSpPr>
-          <p:cNvPr id="19" name="ZoneTexte 18"/>
+      <p:sp>
+        <p:nvSpPr>
+          <p:cNvPr id="10" name="ZoneTexte 9"/>
           <p:cNvSpPr txBox="1"/>
           <p:nvPr/>
         </p:nvSpPr>
         <p:spPr>
           <a:xfrm>
-            <a:off x="2987824" y="476672"/>
-            <a:ext cx="2053063" cy="646331"/>
+            <a:off x="6588224" y="6021288"/>
+            <a:ext cx="1582677" cy="369332"/>
           </a:xfrm>
           <a:prstGeom prst="rect">
             <a:avLst/>
@@ -4696,98 +5663,131 @@
           <a:p>
             <a:r>
               <a:rPr lang="fr-FR" dirty="0" smtClean="0"/>
-              <a:t>Renvoie sur la page </a:t>
-            </a:r>
-          </a:p>
-          <a:p>
-            <a:r>
-              <a:rPr lang="fr-FR" dirty="0" smtClean="0"/>
-              <a:t>‘Emplois’</a:t>
+              <a:t>: Zone de texte</a:t>
             </a:r>
             <a:endParaRPr lang="fr-FR" dirty="0"/>
           </a:p>
         </p:txBody>
       </p:sp>
-      <p:cxnSp>
-        <p:nvCxnSpPr>
-          <p:cNvPr id="22" name="Connecteur droit avec flèche 21"/>
-          <p:cNvCxnSpPr>
-            <a:stCxn id="19" idx="2"/>
-          </p:cNvCxnSpPr>
-          <p:nvPr/>
-        </p:nvCxnSpPr>
-        <p:spPr>
-          <a:xfrm flipH="1">
-            <a:off x="2987824" y="1123003"/>
-            <a:ext cx="1026532" cy="289773"/>
-          </a:xfrm>
-          <a:prstGeom prst="straightConnector1">
-            <a:avLst/>
-          </a:prstGeom>
+    </p:spTree>
+  </p:cSld>
+  <p:clrMapOvr>
+    <a:masterClrMapping/>
+  </p:clrMapOvr>
+</p:sld>
+</file>
+
+<file path=ppt/slides/slide7.xml><?xml version="1.0" encoding="utf-8"?>
+<p:sld xmlns:a="http://schemas.openxmlformats.org/drawingml/2006/main" xmlns:r="http://schemas.openxmlformats.org/officeDocument/2006/relationships" xmlns:p="http://schemas.openxmlformats.org/presentationml/2006/main">
+  <p:cSld>
+    <p:spTree>
+      <p:nvGrpSpPr>
+        <p:cNvPr id="1" name=""/>
+        <p:cNvGrpSpPr/>
+        <p:nvPr/>
+      </p:nvGrpSpPr>
+      <p:grpSpPr>
+        <a:xfrm>
+          <a:off x="0" y="0"/>
+          <a:ext cx="0" cy="0"/>
+          <a:chOff x="0" y="0"/>
+          <a:chExt cx="0" cy="0"/>
+        </a:xfrm>
+      </p:grpSpPr>
+      <p:pic>
+        <p:nvPicPr>
+          <p:cNvPr id="4" name="Image 3" descr="Emploi.png"/>
+          <p:cNvPicPr>
+            <a:picLocks noChangeAspect="1"/>
+          </p:cNvPicPr>
+          <p:nvPr/>
+        </p:nvPicPr>
+        <p:blipFill>
+          <a:blip r:embed="rId2" cstate="print"/>
+          <a:stretch>
+            <a:fillRect/>
+          </a:stretch>
+        </p:blipFill>
+        <p:spPr>
+          <a:xfrm>
+            <a:off x="323528" y="404664"/>
+            <a:ext cx="8377145" cy="5389946"/>
+          </a:xfrm>
+          <a:prstGeom prst="rect">
+            <a:avLst/>
+          </a:prstGeom>
+          <a:ln w="38100" cap="sq">
+            <a:solidFill>
+              <a:srgbClr val="000000"/>
+            </a:solidFill>
+            <a:prstDash val="solid"/>
+            <a:miter lim="800000"/>
+          </a:ln>
+          <a:effectLst>
+            <a:outerShdw blurRad="50800" dist="38100" dir="2700000" algn="tl" rotWithShape="0">
+              <a:srgbClr val="000000">
+                <a:alpha val="43000"/>
+              </a:srgbClr>
+            </a:outerShdw>
+          </a:effectLst>
+        </p:spPr>
+      </p:pic>
+      <p:sp>
+        <p:nvSpPr>
+          <p:cNvPr id="5" name="Rectangle 4"/>
+          <p:cNvSpPr/>
+          <p:nvPr/>
+        </p:nvSpPr>
+        <p:spPr>
+          <a:xfrm>
+            <a:off x="899592" y="6093296"/>
+            <a:ext cx="648072" cy="288032"/>
+          </a:xfrm>
+          <a:prstGeom prst="rect">
+            <a:avLst/>
+          </a:prstGeom>
+          <a:solidFill>
+            <a:srgbClr val="00B050"/>
+          </a:solidFill>
           <a:ln>
-            <a:tailEnd type="arrow"/>
+            <a:solidFill>
+              <a:schemeClr val="tx1"/>
+            </a:solidFill>
           </a:ln>
         </p:spPr>
         <p:style>
-          <a:lnRef idx="1">
-            <a:schemeClr val="dk1"/>
+          <a:lnRef idx="3">
+            <a:schemeClr val="lt1"/>
           </a:lnRef>
-          <a:fillRef idx="0">
-            <a:schemeClr val="dk1"/>
+          <a:fillRef idx="1">
+            <a:schemeClr val="accent3"/>
           </a:fillRef>
-          <a:effectRef idx="0">
-            <a:schemeClr val="dk1"/>
+          <a:effectRef idx="1">
+            <a:schemeClr val="accent3"/>
           </a:effectRef>
           <a:fontRef idx="minor">
-            <a:schemeClr val="tx1"/>
+            <a:schemeClr val="lt1"/>
           </a:fontRef>
         </p:style>
-      </p:cxnSp>
-      <p:cxnSp>
-        <p:nvCxnSpPr>
-          <p:cNvPr id="24" name="Connecteur droit avec flèche 23"/>
-          <p:cNvCxnSpPr>
-            <a:stCxn id="25" idx="0"/>
-          </p:cNvCxnSpPr>
-          <p:nvPr/>
-        </p:nvCxnSpPr>
-        <p:spPr>
-          <a:xfrm flipH="1" flipV="1">
-            <a:off x="4427984" y="1484784"/>
-            <a:ext cx="182175" cy="1152128"/>
-          </a:xfrm>
-          <a:prstGeom prst="straightConnector1">
-            <a:avLst/>
-          </a:prstGeom>
-          <a:ln>
-            <a:tailEnd type="arrow"/>
-          </a:ln>
-        </p:spPr>
-        <p:style>
-          <a:lnRef idx="1">
-            <a:schemeClr val="dk1"/>
-          </a:lnRef>
-          <a:fillRef idx="0">
-            <a:schemeClr val="dk1"/>
-          </a:fillRef>
-          <a:effectRef idx="0">
-            <a:schemeClr val="dk1"/>
-          </a:effectRef>
-          <a:fontRef idx="minor">
-            <a:schemeClr val="tx1"/>
-          </a:fontRef>
-        </p:style>
-      </p:cxnSp>
-      <p:sp>
-        <p:nvSpPr>
-          <p:cNvPr id="25" name="ZoneTexte 24"/>
+        <p:txBody>
+          <a:bodyPr rtlCol="0" anchor="ctr"/>
+          <a:lstStyle/>
+          <a:p>
+            <a:pPr algn="ctr"/>
+            <a:endParaRPr lang="fr-FR" dirty="0"/>
+          </a:p>
+        </p:txBody>
+      </p:sp>
+      <p:sp>
+        <p:nvSpPr>
+          <p:cNvPr id="6" name="ZoneTexte 5"/>
           <p:cNvSpPr txBox="1"/>
           <p:nvPr/>
         </p:nvSpPr>
         <p:spPr>
           <a:xfrm>
-            <a:off x="2915816" y="2636912"/>
-            <a:ext cx="3388685" cy="646331"/>
+            <a:off x="1547664" y="6021288"/>
+            <a:ext cx="875240" cy="369332"/>
           </a:xfrm>
           <a:prstGeom prst="rect">
             <a:avLst/>
@@ -4802,31 +5802,114 @@
           <a:p>
             <a:r>
               <a:rPr lang="fr-FR" dirty="0" smtClean="0"/>
-              <a:t>Permet de chercher une personne</a:t>
-            </a:r>
-          </a:p>
-          <a:p>
-            <a:r>
-              <a:rPr lang="fr-FR" dirty="0"/>
-              <a:t>o</a:t>
-            </a:r>
-            <a:r>
-              <a:rPr lang="fr-FR" dirty="0" smtClean="0"/>
-              <a:t>u un contenu</a:t>
-            </a:r>
-          </a:p>
-        </p:txBody>
-      </p:sp>
-      <p:sp>
-        <p:nvSpPr>
-          <p:cNvPr id="27" name="ZoneTexte 26"/>
+              <a:t>: Image</a:t>
+            </a:r>
+            <a:endParaRPr lang="fr-FR" dirty="0"/>
+          </a:p>
+        </p:txBody>
+      </p:sp>
+      <p:sp>
+        <p:nvSpPr>
+          <p:cNvPr id="7" name="Rectangle 6"/>
+          <p:cNvSpPr/>
+          <p:nvPr/>
+        </p:nvSpPr>
+        <p:spPr>
+          <a:xfrm>
+            <a:off x="3563888" y="6093296"/>
+            <a:ext cx="648072" cy="288032"/>
+          </a:xfrm>
+          <a:prstGeom prst="rect">
+            <a:avLst/>
+          </a:prstGeom>
+          <a:solidFill>
+            <a:srgbClr val="FF0000"/>
+          </a:solidFill>
+          <a:ln>
+            <a:solidFill>
+              <a:schemeClr val="tx1"/>
+            </a:solidFill>
+          </a:ln>
+        </p:spPr>
+        <p:style>
+          <a:lnRef idx="3">
+            <a:schemeClr val="lt1"/>
+          </a:lnRef>
+          <a:fillRef idx="1">
+            <a:schemeClr val="accent3"/>
+          </a:fillRef>
+          <a:effectRef idx="1">
+            <a:schemeClr val="accent3"/>
+          </a:effectRef>
+          <a:fontRef idx="minor">
+            <a:schemeClr val="lt1"/>
+          </a:fontRef>
+        </p:style>
+        <p:txBody>
+          <a:bodyPr rtlCol="0" anchor="ctr"/>
+          <a:lstStyle/>
+          <a:p>
+            <a:pPr algn="ctr"/>
+            <a:endParaRPr lang="fr-FR" dirty="0"/>
+          </a:p>
+        </p:txBody>
+      </p:sp>
+      <p:sp>
+        <p:nvSpPr>
+          <p:cNvPr id="8" name="Rectangle 7"/>
+          <p:cNvSpPr/>
+          <p:nvPr/>
+        </p:nvSpPr>
+        <p:spPr>
+          <a:xfrm>
+            <a:off x="5940152" y="6093296"/>
+            <a:ext cx="648072" cy="288032"/>
+          </a:xfrm>
+          <a:prstGeom prst="rect">
+            <a:avLst/>
+          </a:prstGeom>
+          <a:solidFill>
+            <a:srgbClr val="00B0F0"/>
+          </a:solidFill>
+          <a:ln>
+            <a:solidFill>
+              <a:schemeClr val="tx1"/>
+            </a:solidFill>
+          </a:ln>
+        </p:spPr>
+        <p:style>
+          <a:lnRef idx="3">
+            <a:schemeClr val="lt1"/>
+          </a:lnRef>
+          <a:fillRef idx="1">
+            <a:schemeClr val="accent3"/>
+          </a:fillRef>
+          <a:effectRef idx="1">
+            <a:schemeClr val="accent3"/>
+          </a:effectRef>
+          <a:fontRef idx="minor">
+            <a:schemeClr val="lt1"/>
+          </a:fontRef>
+        </p:style>
+        <p:txBody>
+          <a:bodyPr rtlCol="0" anchor="ctr"/>
+          <a:lstStyle/>
+          <a:p>
+            <a:pPr algn="ctr"/>
+            <a:endParaRPr lang="fr-FR" dirty="0"/>
+          </a:p>
+        </p:txBody>
+      </p:sp>
+      <p:sp>
+        <p:nvSpPr>
+          <p:cNvPr id="9" name="ZoneTexte 8"/>
           <p:cNvSpPr txBox="1"/>
           <p:nvPr/>
         </p:nvSpPr>
         <p:spPr>
           <a:xfrm>
-            <a:off x="4499992" y="0"/>
-            <a:ext cx="2679260" cy="646331"/>
+            <a:off x="4211960" y="6021288"/>
+            <a:ext cx="987130" cy="369332"/>
           </a:xfrm>
           <a:prstGeom prst="rect">
             <a:avLst/>
@@ -4841,66 +5924,22 @@
           <a:p>
             <a:r>
               <a:rPr lang="fr-FR" dirty="0" smtClean="0"/>
-              <a:t>Active un onglet déroulant</a:t>
-            </a:r>
-          </a:p>
-          <a:p>
-            <a:r>
-              <a:rPr lang="fr-FR" dirty="0"/>
-              <a:t>a</a:t>
-            </a:r>
-            <a:r>
-              <a:rPr lang="fr-FR" dirty="0" smtClean="0"/>
-              <a:t>ffichant les notifications</a:t>
-            </a:r>
-          </a:p>
-        </p:txBody>
-      </p:sp>
-      <p:cxnSp>
-        <p:nvCxnSpPr>
-          <p:cNvPr id="29" name="Connecteur droit avec flèche 28"/>
-          <p:cNvCxnSpPr>
-            <a:stCxn id="27" idx="2"/>
-          </p:cNvCxnSpPr>
-          <p:nvPr/>
-        </p:nvCxnSpPr>
-        <p:spPr>
-          <a:xfrm>
-            <a:off x="5839622" y="646331"/>
-            <a:ext cx="172538" cy="838453"/>
-          </a:xfrm>
-          <a:prstGeom prst="straightConnector1">
-            <a:avLst/>
-          </a:prstGeom>
-          <a:ln>
-            <a:tailEnd type="arrow"/>
-          </a:ln>
-        </p:spPr>
-        <p:style>
-          <a:lnRef idx="1">
-            <a:schemeClr val="dk1"/>
-          </a:lnRef>
-          <a:fillRef idx="0">
-            <a:schemeClr val="dk1"/>
-          </a:fillRef>
-          <a:effectRef idx="0">
-            <a:schemeClr val="dk1"/>
-          </a:effectRef>
-          <a:fontRef idx="minor">
-            <a:schemeClr val="tx1"/>
-          </a:fontRef>
-        </p:style>
-      </p:cxnSp>
-      <p:sp>
-        <p:nvSpPr>
-          <p:cNvPr id="30" name="ZoneTexte 29"/>
+              <a:t>: Bouton</a:t>
+            </a:r>
+            <a:endParaRPr lang="fr-FR" dirty="0"/>
+          </a:p>
+        </p:txBody>
+      </p:sp>
+      <p:sp>
+        <p:nvSpPr>
+          <p:cNvPr id="10" name="ZoneTexte 9"/>
           <p:cNvSpPr txBox="1"/>
           <p:nvPr/>
         </p:nvSpPr>
         <p:spPr>
           <a:xfrm>
-            <a:off x="6084168" y="548680"/>
-            <a:ext cx="2679260" cy="646331"/>
+            <a:off x="6588224" y="6021288"/>
+            <a:ext cx="1582677" cy="369332"/>
           </a:xfrm>
           <a:prstGeom prst="rect">
             <a:avLst/>
@@ -4915,128 +5954,7 @@
           <a:p>
             <a:r>
               <a:rPr lang="fr-FR" dirty="0" smtClean="0"/>
-              <a:t>Active un onglet déroulant</a:t>
-            </a:r>
-          </a:p>
-          <a:p>
-            <a:r>
-              <a:rPr lang="fr-FR" dirty="0" smtClean="0"/>
-              <a:t>affichant les messages</a:t>
-            </a:r>
-          </a:p>
-        </p:txBody>
-      </p:sp>
-      <p:cxnSp>
-        <p:nvCxnSpPr>
-          <p:cNvPr id="33" name="Connecteur droit avec flèche 32"/>
-          <p:cNvCxnSpPr>
-            <a:stCxn id="30" idx="2"/>
-          </p:cNvCxnSpPr>
-          <p:nvPr/>
-        </p:nvCxnSpPr>
-        <p:spPr>
-          <a:xfrm flipH="1">
-            <a:off x="7092280" y="1195011"/>
-            <a:ext cx="331518" cy="217765"/>
-          </a:xfrm>
-          <a:prstGeom prst="straightConnector1">
-            <a:avLst/>
-          </a:prstGeom>
-          <a:ln>
-            <a:tailEnd type="arrow"/>
-          </a:ln>
-        </p:spPr>
-        <p:style>
-          <a:lnRef idx="1">
-            <a:schemeClr val="dk1"/>
-          </a:lnRef>
-          <a:fillRef idx="0">
-            <a:schemeClr val="dk1"/>
-          </a:fillRef>
-          <a:effectRef idx="0">
-            <a:schemeClr val="dk1"/>
-          </a:effectRef>
-          <a:fontRef idx="minor">
-            <a:schemeClr val="tx1"/>
-          </a:fontRef>
-        </p:style>
-      </p:cxnSp>
-      <p:cxnSp>
-        <p:nvCxnSpPr>
-          <p:cNvPr id="35" name="Connecteur droit avec flèche 34"/>
-          <p:cNvCxnSpPr>
-            <a:stCxn id="36" idx="0"/>
-          </p:cNvCxnSpPr>
-          <p:nvPr/>
-        </p:nvCxnSpPr>
-        <p:spPr>
-          <a:xfrm flipV="1">
-            <a:off x="5378786" y="1628800"/>
-            <a:ext cx="2505582" cy="2232248"/>
-          </a:xfrm>
-          <a:prstGeom prst="straightConnector1">
-            <a:avLst/>
-          </a:prstGeom>
-          <a:ln>
-            <a:tailEnd type="arrow"/>
-          </a:ln>
-        </p:spPr>
-        <p:style>
-          <a:lnRef idx="1">
-            <a:schemeClr val="dk1"/>
-          </a:lnRef>
-          <a:fillRef idx="0">
-            <a:schemeClr val="dk1"/>
-          </a:fillRef>
-          <a:effectRef idx="0">
-            <a:schemeClr val="dk1"/>
-          </a:effectRef>
-          <a:fontRef idx="minor">
-            <a:schemeClr val="tx1"/>
-          </a:fontRef>
-        </p:style>
-      </p:cxnSp>
-      <p:sp>
-        <p:nvSpPr>
-          <p:cNvPr id="36" name="ZoneTexte 35"/>
-          <p:cNvSpPr txBox="1"/>
-          <p:nvPr/>
-        </p:nvSpPr>
-        <p:spPr>
-          <a:xfrm>
-            <a:off x="4211960" y="3861048"/>
-            <a:ext cx="2333652" cy="923330"/>
-          </a:xfrm>
-          <a:prstGeom prst="rect">
-            <a:avLst/>
-          </a:prstGeom>
-          <a:noFill/>
-        </p:spPr>
-        <p:txBody>
-          <a:bodyPr wrap="none" rtlCol="0">
-            <a:spAutoFit/>
-          </a:bodyPr>
-          <a:lstStyle/>
-          <a:p>
-            <a:r>
-              <a:rPr lang="fr-FR" dirty="0" smtClean="0"/>
-              <a:t>Onglet déroulant pour </a:t>
-            </a:r>
-          </a:p>
-          <a:p>
-            <a:r>
-              <a:rPr lang="fr-FR" dirty="0" smtClean="0"/>
-              <a:t>accéder à son profil ou</a:t>
-            </a:r>
-          </a:p>
-          <a:p>
-            <a:r>
-              <a:rPr lang="fr-FR" dirty="0"/>
-              <a:t>s</a:t>
-            </a:r>
-            <a:r>
-              <a:rPr lang="fr-FR" dirty="0" smtClean="0"/>
-              <a:t>e déconnecter</a:t>
+              <a:t>: Zone de texte</a:t>
             </a:r>
             <a:endParaRPr lang="fr-FR" dirty="0"/>
           </a:p>

</xml_diff>